<commit_message>
ppt수정 테이블 수정 Signed-off-by: ITFE-7 <ITFE-7@ITFE-07>
</commit_message>
<xml_diff>
--- a/WebContent/common/5조.YamaManProject.pptx
+++ b/WebContent/common/5조.YamaManProject.pptx
@@ -31,15 +31,15 @@
       <p:bold r:id="rId14"/>
     </p:embeddedFont>
     <p:embeddedFont>
-      <p:font typeface="Proxima Nova" panose="020B0604020202020204" charset="0"/>
+      <p:font typeface="휴먼엑스포" panose="02030504000101010101" pitchFamily="18" charset="-127"/>
       <p:regular r:id="rId15"/>
-      <p:bold r:id="rId16"/>
-      <p:italic r:id="rId17"/>
-      <p:boldItalic r:id="rId18"/>
     </p:embeddedFont>
     <p:embeddedFont>
-      <p:font typeface="휴먼엑스포" panose="02030504000101010101" pitchFamily="18" charset="-127"/>
-      <p:regular r:id="rId19"/>
+      <p:font typeface="Proxima Nova" panose="020B0604020202020204" charset="0"/>
+      <p:regular r:id="rId16"/>
+      <p:bold r:id="rId17"/>
+      <p:italic r:id="rId18"/>
+      <p:boldItalic r:id="rId19"/>
     </p:embeddedFont>
     <p:embeddedFont>
       <p:font typeface="HY견고딕" panose="02030600000101010101" pitchFamily="18" charset="-127"/>
@@ -5836,42 +5836,6 @@
               <a:buNone/>
             </a:pPr>
             <a:r>
-              <a:rPr lang="ko" b="1" dirty="0" smtClean="0">
-                <a:solidFill>
-                  <a:srgbClr val="00B050"/>
-                </a:solidFill>
-                <a:latin typeface="Malgun Gothic"/>
-                <a:ea typeface="Malgun Gothic"/>
-                <a:cs typeface="Malgun Gothic"/>
-                <a:sym typeface="Malgun Gothic"/>
-              </a:rPr>
-              <a:t>테이블 </a:t>
-            </a:r>
-            <a:r>
-              <a:rPr lang="ko" b="1" dirty="0">
-                <a:solidFill>
-                  <a:srgbClr val="00B050"/>
-                </a:solidFill>
-                <a:latin typeface="Malgun Gothic"/>
-                <a:ea typeface="Malgun Gothic"/>
-                <a:cs typeface="Malgun Gothic"/>
-                <a:sym typeface="Malgun Gothic"/>
-              </a:rPr>
-              <a:t>명세</a:t>
-            </a:r>
-            <a:r>
-              <a:rPr lang="ko" b="1" dirty="0" smtClean="0">
-                <a:solidFill>
-                  <a:srgbClr val="00B050"/>
-                </a:solidFill>
-                <a:latin typeface="Malgun Gothic"/>
-                <a:ea typeface="Malgun Gothic"/>
-                <a:cs typeface="Malgun Gothic"/>
-                <a:sym typeface="Malgun Gothic"/>
-              </a:rPr>
-              <a:t>(</a:t>
-            </a:r>
-            <a:r>
               <a:rPr lang="en-US" altLang="ko" b="1" dirty="0" smtClean="0">
                 <a:solidFill>
                   <a:srgbClr val="00B050"/>
@@ -5882,18 +5846,6 @@
                 <a:sym typeface="Malgun Gothic"/>
               </a:rPr>
               <a:t>Members</a:t>
-            </a:r>
-            <a:r>
-              <a:rPr lang="ko" b="1" dirty="0" smtClean="0">
-                <a:solidFill>
-                  <a:srgbClr val="00B050"/>
-                </a:solidFill>
-                <a:latin typeface="Malgun Gothic"/>
-                <a:ea typeface="Malgun Gothic"/>
-                <a:cs typeface="Malgun Gothic"/>
-                <a:sym typeface="Malgun Gothic"/>
-              </a:rPr>
-              <a:t>)</a:t>
             </a:r>
             <a:endParaRPr lang="ko" b="1" dirty="0">
               <a:solidFill>
@@ -6772,30 +6724,6 @@
               <a:buNone/>
             </a:pPr>
             <a:r>
-              <a:rPr lang="ko" b="1" dirty="0">
-                <a:solidFill>
-                  <a:srgbClr val="00B050"/>
-                </a:solidFill>
-                <a:latin typeface="Malgun Gothic"/>
-                <a:ea typeface="Malgun Gothic"/>
-                <a:cs typeface="Malgun Gothic"/>
-                <a:sym typeface="Malgun Gothic"/>
-              </a:rPr>
-              <a:t>테이블 명세</a:t>
-            </a:r>
-            <a:r>
-              <a:rPr lang="ko" b="1" dirty="0" smtClean="0">
-                <a:solidFill>
-                  <a:srgbClr val="00B050"/>
-                </a:solidFill>
-                <a:latin typeface="Malgun Gothic"/>
-                <a:ea typeface="Malgun Gothic"/>
-                <a:cs typeface="Malgun Gothic"/>
-                <a:sym typeface="Malgun Gothic"/>
-              </a:rPr>
-              <a:t>(</a:t>
-            </a:r>
-            <a:r>
               <a:rPr lang="en-US" altLang="ko" b="1" dirty="0" smtClean="0">
                 <a:solidFill>
                   <a:srgbClr val="00B050"/>
@@ -6807,18 +6735,6 @@
               </a:rPr>
               <a:t>Boards</a:t>
             </a:r>
-            <a:r>
-              <a:rPr lang="ko" b="1" dirty="0" smtClean="0">
-                <a:solidFill>
-                  <a:srgbClr val="00B050"/>
-                </a:solidFill>
-                <a:latin typeface="Malgun Gothic"/>
-                <a:ea typeface="Malgun Gothic"/>
-                <a:cs typeface="Malgun Gothic"/>
-                <a:sym typeface="Malgun Gothic"/>
-              </a:rPr>
-              <a:t>)</a:t>
-            </a:r>
             <a:endParaRPr lang="ko" b="1" dirty="0">
               <a:solidFill>
                 <a:srgbClr val="00B050"/>
@@ -6838,14 +6754,14 @@
           <p:nvPr>
             <p:extLst>
               <p:ext uri="{D42A27DB-BD31-4B8C-83A1-F6EECF244321}">
-                <p14:modId xmlns:p14="http://schemas.microsoft.com/office/powerpoint/2010/main" val="1154355156"/>
+                <p14:modId xmlns:p14="http://schemas.microsoft.com/office/powerpoint/2010/main" val="321701449"/>
               </p:ext>
             </p:extLst>
           </p:nvPr>
         </p:nvGraphicFramePr>
         <p:xfrm>
           <a:off x="251520" y="699542"/>
-          <a:ext cx="8484750" cy="4404000"/>
+          <a:ext cx="8484750" cy="4053840"/>
         </p:xfrm>
         <a:graphic>
           <a:graphicData uri="http://schemas.openxmlformats.org/drawingml/2006/table">
@@ -6860,7 +6776,7 @@
                 <a:gridCol w="2952328"/>
                 <a:gridCol w="2076038"/>
               </a:tblGrid>
-              <a:tr h="360000">
+              <a:tr h="289560">
                 <a:tc>
                   <a:txBody>
                     <a:bodyPr/>
@@ -6883,7 +6799,7 @@
                       </a:r>
                     </a:p>
                   </a:txBody>
-                  <a:tcPr marL="91425" marR="91425" marT="91425" marB="91425"/>
+                  <a:tcPr/>
                 </a:tc>
                 <a:tc>
                   <a:txBody>
@@ -6907,7 +6823,7 @@
                       </a:r>
                     </a:p>
                   </a:txBody>
-                  <a:tcPr marL="91425" marR="91425" marT="91425" marB="91425"/>
+                  <a:tcPr/>
                 </a:tc>
                 <a:tc>
                   <a:txBody>
@@ -6931,7 +6847,7 @@
                       </a:r>
                     </a:p>
                   </a:txBody>
-                  <a:tcPr marL="91425" marR="91425" marT="91425" marB="91425"/>
+                  <a:tcPr/>
                 </a:tc>
                 <a:tc>
                   <a:txBody>
@@ -6955,10 +6871,10 @@
                       </a:r>
                     </a:p>
                   </a:txBody>
-                  <a:tcPr marL="91425" marR="91425" marT="91425" marB="91425"/>
+                  <a:tcPr/>
                 </a:tc>
               </a:tr>
-              <a:tr h="360000">
+              <a:tr h="289560">
                 <a:tc>
                   <a:txBody>
                     <a:bodyPr/>
@@ -6987,7 +6903,7 @@
                       </a:endParaRPr>
                     </a:p>
                   </a:txBody>
-                  <a:tcPr marL="91425" marR="91425" marT="91425" marB="91425"/>
+                  <a:tcPr/>
                 </a:tc>
                 <a:tc>
                   <a:txBody>
@@ -7026,7 +6942,7 @@
                       </a:endParaRPr>
                     </a:p>
                   </a:txBody>
-                  <a:tcPr marL="91425" marR="91425" marT="91425" marB="91425"/>
+                  <a:tcPr/>
                 </a:tc>
                 <a:tc>
                   <a:txBody>
@@ -7050,7 +6966,7 @@
                       </a:r>
                     </a:p>
                   </a:txBody>
-                  <a:tcPr marL="91425" marR="91425" marT="91425" marB="91425"/>
+                  <a:tcPr/>
                 </a:tc>
                 <a:tc>
                   <a:txBody>
@@ -7074,10 +6990,10 @@
                       </a:r>
                     </a:p>
                   </a:txBody>
-                  <a:tcPr marL="91425" marR="91425" marT="91425" marB="91425"/>
+                  <a:tcPr/>
                 </a:tc>
               </a:tr>
-              <a:tr h="360000">
+              <a:tr h="289560">
                 <a:tc>
                   <a:txBody>
                     <a:bodyPr/>
@@ -7106,7 +7022,7 @@
                       </a:endParaRPr>
                     </a:p>
                   </a:txBody>
-                  <a:tcPr marL="91425" marR="91425" marT="91425" marB="91425"/>
+                  <a:tcPr/>
                 </a:tc>
                 <a:tc>
                   <a:txBody>
@@ -7136,7 +7052,7 @@
                       </a:endParaRPr>
                     </a:p>
                   </a:txBody>
-                  <a:tcPr marL="91425" marR="91425" marT="91425" marB="91425"/>
+                  <a:tcPr/>
                 </a:tc>
                 <a:tc>
                   <a:txBody>
@@ -7166,7 +7082,7 @@
                       </a:endParaRPr>
                     </a:p>
                   </a:txBody>
-                  <a:tcPr marL="91425" marR="91425" marT="91425" marB="91425"/>
+                  <a:tcPr/>
                 </a:tc>
                 <a:tc>
                   <a:txBody>
@@ -7187,10 +7103,10 @@
                       </a:endParaRPr>
                     </a:p>
                   </a:txBody>
-                  <a:tcPr marL="91425" marR="91425" marT="91425" marB="91425"/>
+                  <a:tcPr/>
                 </a:tc>
               </a:tr>
-              <a:tr h="360000">
+              <a:tr h="289560">
                 <a:tc>
                   <a:txBody>
                     <a:bodyPr/>
@@ -7219,7 +7135,7 @@
                       </a:endParaRPr>
                     </a:p>
                   </a:txBody>
-                  <a:tcPr marL="91425" marR="91425" marT="91425" marB="91425"/>
+                  <a:tcPr/>
                 </a:tc>
                 <a:tc>
                   <a:txBody>
@@ -7249,7 +7165,7 @@
                       </a:endParaRPr>
                     </a:p>
                   </a:txBody>
-                  <a:tcPr marL="91425" marR="91425" marT="91425" marB="91425"/>
+                  <a:tcPr/>
                 </a:tc>
                 <a:tc>
                   <a:txBody>
@@ -7279,7 +7195,7 @@
                       </a:endParaRPr>
                     </a:p>
                   </a:txBody>
-                  <a:tcPr marL="91425" marR="91425" marT="91425" marB="91425"/>
+                  <a:tcPr/>
                 </a:tc>
                 <a:tc>
                   <a:txBody>
@@ -7300,29 +7216,29 @@
                       </a:endParaRPr>
                     </a:p>
                   </a:txBody>
-                  <a:tcPr marL="91425" marR="91425" marT="91425" marB="91425"/>
+                  <a:tcPr/>
                 </a:tc>
               </a:tr>
-              <a:tr h="360000">
-                <a:tc>
-                  <a:txBody>
-                    <a:bodyPr/>
-                    <a:lstStyle/>
-                    <a:p>
-                      <a:pPr lvl="0" algn="l">
-                        <a:spcBef>
-                          <a:spcPts val="0"/>
-                        </a:spcBef>
-                        <a:buNone/>
-                      </a:pPr>
-                      <a:r>
-                        <a:rPr lang="en-US" altLang="ko" sz="1200" dirty="0" smtClean="0">
+              <a:tr h="289560">
+                <a:tc>
+                  <a:txBody>
+                    <a:bodyPr/>
+                    <a:lstStyle/>
+                    <a:p>
+                      <a:pPr lvl="0" algn="l" rtl="0">
+                        <a:spcBef>
+                          <a:spcPts val="0"/>
+                        </a:spcBef>
+                        <a:buNone/>
+                      </a:pPr>
+                      <a:r>
+                        <a:rPr lang="en-US" altLang="ko" sz="1200" dirty="0" err="1" smtClean="0">
                           <a:latin typeface="+mn-ea"/>
                           <a:ea typeface="+mn-ea"/>
                           <a:cs typeface="Malgun Gothic"/>
                           <a:sym typeface="Malgun Gothic"/>
                         </a:rPr>
-                        <a:t>board_writer</a:t>
+                        <a:t>board_content</a:t>
                       </a:r>
                       <a:endParaRPr lang="ko" sz="1200" dirty="0">
                         <a:latin typeface="+mn-ea"/>
@@ -7332,7 +7248,7 @@
                       </a:endParaRPr>
                     </a:p>
                   </a:txBody>
-                  <a:tcPr marL="91425" marR="91425" marT="91425" marB="91425"/>
+                  <a:tcPr/>
                 </a:tc>
                 <a:tc>
                   <a:txBody>
@@ -7352,34 +7268,7 @@
                           <a:cs typeface="Malgun Gothic"/>
                           <a:sym typeface="Malgun Gothic"/>
                         </a:rPr>
-                        <a:t>v</a:t>
-                      </a:r>
-                      <a:r>
-                        <a:rPr lang="ko" sz="1200" dirty="0" smtClean="0">
-                          <a:latin typeface="+mn-ea"/>
-                          <a:ea typeface="+mn-ea"/>
-                          <a:cs typeface="Malgun Gothic"/>
-                          <a:sym typeface="Malgun Gothic"/>
-                        </a:rPr>
-                        <a:t>archar2(</a:t>
-                      </a:r>
-                      <a:r>
-                        <a:rPr lang="en-US" altLang="ko" sz="1200" dirty="0" smtClean="0">
-                          <a:latin typeface="+mn-ea"/>
-                          <a:ea typeface="+mn-ea"/>
-                          <a:cs typeface="Malgun Gothic"/>
-                          <a:sym typeface="Malgun Gothic"/>
-                        </a:rPr>
-                        <a:t>15</a:t>
-                      </a:r>
-                      <a:r>
-                        <a:rPr lang="ko" sz="1200" dirty="0" smtClean="0">
-                          <a:latin typeface="+mn-ea"/>
-                          <a:ea typeface="+mn-ea"/>
-                          <a:cs typeface="Malgun Gothic"/>
-                          <a:sym typeface="Malgun Gothic"/>
-                        </a:rPr>
-                        <a:t>)</a:t>
+                        <a:t>varchar2(500)</a:t>
                       </a:r>
                       <a:endParaRPr lang="ko" sz="1200" dirty="0">
                         <a:latin typeface="+mn-ea"/>
@@ -7389,7 +7278,7 @@
                       </a:endParaRPr>
                     </a:p>
                   </a:txBody>
-                  <a:tcPr marL="91425" marR="91425" marT="91425" marB="91425"/>
+                  <a:tcPr/>
                 </a:tc>
                 <a:tc>
                   <a:txBody>
@@ -7403,13 +7292,22 @@
                         <a:buNone/>
                       </a:pPr>
                       <a:r>
-                        <a:rPr lang="ko-KR" altLang="en-US" sz="1200" dirty="0" smtClean="0">
+                        <a:rPr lang="ko-KR" altLang="en-US" sz="1200" dirty="0" err="1" smtClean="0">
                           <a:latin typeface="+mn-ea"/>
                           <a:ea typeface="+mn-ea"/>
                           <a:cs typeface="Malgun Gothic"/>
                           <a:sym typeface="Malgun Gothic"/>
                         </a:rPr>
-                        <a:t>작성자의 아이디</a:t>
+                        <a:t>게시글</a:t>
+                      </a:r>
+                      <a:r>
+                        <a:rPr lang="ko-KR" altLang="en-US" sz="1200" dirty="0" smtClean="0">
+                          <a:latin typeface="+mn-ea"/>
+                          <a:ea typeface="+mn-ea"/>
+                          <a:cs typeface="Malgun Gothic"/>
+                          <a:sym typeface="Malgun Gothic"/>
+                        </a:rPr>
+                        <a:t> 내용</a:t>
                       </a:r>
                       <a:endParaRPr lang="ko" sz="1200" dirty="0">
                         <a:latin typeface="+mn-ea"/>
@@ -7419,7 +7317,7 @@
                       </a:endParaRPr>
                     </a:p>
                   </a:txBody>
-                  <a:tcPr marL="91425" marR="91425" marT="91425" marB="91425"/>
+                  <a:tcPr/>
                 </a:tc>
                 <a:tc>
                   <a:txBody>
@@ -7432,15 +7330,6 @@
                         </a:spcBef>
                         <a:buNone/>
                       </a:pPr>
-                      <a:r>
-                        <a:rPr lang="ko" sz="1200" dirty="0" smtClean="0">
-                          <a:latin typeface="+mn-ea"/>
-                          <a:ea typeface="+mn-ea"/>
-                          <a:cs typeface="Malgun Gothic"/>
-                          <a:sym typeface="Malgun Gothic"/>
-                        </a:rPr>
-                        <a:t>FK</a:t>
-                      </a:r>
                       <a:endParaRPr lang="ko" sz="1200" dirty="0">
                         <a:latin typeface="+mn-ea"/>
                         <a:ea typeface="+mn-ea"/>
@@ -7449,10 +7338,10 @@
                       </a:endParaRPr>
                     </a:p>
                   </a:txBody>
-                  <a:tcPr marL="91425" marR="91425" marT="91425" marB="91425"/>
+                  <a:tcPr/>
                 </a:tc>
               </a:tr>
-              <a:tr h="360000">
+              <a:tr h="289560">
                 <a:tc>
                   <a:txBody>
                     <a:bodyPr/>
@@ -7471,7 +7360,7 @@
                           <a:cs typeface="Malgun Gothic"/>
                           <a:sym typeface="Malgun Gothic"/>
                         </a:rPr>
-                        <a:t>board_writ_date</a:t>
+                        <a:t>board_writer</a:t>
                       </a:r>
                       <a:endParaRPr lang="ko" sz="1200" dirty="0">
                         <a:latin typeface="+mn-ea"/>
@@ -7481,7 +7370,7 @@
                       </a:endParaRPr>
                     </a:p>
                   </a:txBody>
-                  <a:tcPr marL="91425" marR="91425" marT="91425" marB="91425"/>
+                  <a:tcPr/>
                 </a:tc>
                 <a:tc>
                   <a:txBody>
@@ -7501,7 +7390,7 @@
                           <a:cs typeface="Malgun Gothic"/>
                           <a:sym typeface="Malgun Gothic"/>
                         </a:rPr>
-                        <a:t>d</a:t>
+                        <a:t>v</a:t>
                       </a:r>
                       <a:r>
                         <a:rPr lang="ko" sz="1200" dirty="0" smtClean="0">
@@ -7510,7 +7399,25 @@
                           <a:cs typeface="Malgun Gothic"/>
                           <a:sym typeface="Malgun Gothic"/>
                         </a:rPr>
-                        <a:t>ate</a:t>
+                        <a:t>archar2(</a:t>
+                      </a:r>
+                      <a:r>
+                        <a:rPr lang="en-US" altLang="ko" sz="1200" dirty="0" smtClean="0">
+                          <a:latin typeface="+mn-ea"/>
+                          <a:ea typeface="+mn-ea"/>
+                          <a:cs typeface="Malgun Gothic"/>
+                          <a:sym typeface="Malgun Gothic"/>
+                        </a:rPr>
+                        <a:t>15</a:t>
+                      </a:r>
+                      <a:r>
+                        <a:rPr lang="ko" sz="1200" dirty="0" smtClean="0">
+                          <a:latin typeface="+mn-ea"/>
+                          <a:ea typeface="+mn-ea"/>
+                          <a:cs typeface="Malgun Gothic"/>
+                          <a:sym typeface="Malgun Gothic"/>
+                        </a:rPr>
+                        <a:t>)</a:t>
                       </a:r>
                       <a:endParaRPr lang="ko" sz="1200" dirty="0">
                         <a:latin typeface="+mn-ea"/>
@@ -7520,7 +7427,7 @@
                       </a:endParaRPr>
                     </a:p>
                   </a:txBody>
-                  <a:tcPr marL="91425" marR="91425" marT="91425" marB="91425"/>
+                  <a:tcPr/>
                 </a:tc>
                 <a:tc>
                   <a:txBody>
@@ -7534,40 +7441,13 @@
                         <a:buNone/>
                       </a:pPr>
                       <a:r>
-                        <a:rPr lang="ko" sz="1200" dirty="0">
+                        <a:rPr lang="ko-KR" altLang="en-US" sz="1200" dirty="0" smtClean="0">
                           <a:latin typeface="+mn-ea"/>
                           <a:ea typeface="+mn-ea"/>
                           <a:cs typeface="Malgun Gothic"/>
                           <a:sym typeface="Malgun Gothic"/>
                         </a:rPr>
-                        <a:t>게시글 </a:t>
-                      </a:r>
-                      <a:r>
-                        <a:rPr lang="ko" sz="1200" dirty="0" smtClean="0">
-                          <a:latin typeface="+mn-ea"/>
-                          <a:ea typeface="+mn-ea"/>
-                          <a:cs typeface="Malgun Gothic"/>
-                          <a:sym typeface="Malgun Gothic"/>
-                        </a:rPr>
-                        <a:t>작</a:t>
-                      </a:r>
-                      <a:r>
-                        <a:rPr lang="ko-KR" altLang="en-US" sz="1200" dirty="0" smtClean="0">
-                          <a:latin typeface="+mn-ea"/>
-                          <a:ea typeface="+mn-ea"/>
-                          <a:cs typeface="Malgun Gothic"/>
-                          <a:sym typeface="Malgun Gothic"/>
-                        </a:rPr>
-                        <a:t>성</a:t>
-                      </a:r>
-                      <a:r>
-                        <a:rPr lang="ko-KR" altLang="en-US" sz="1200" baseline="0" dirty="0" smtClean="0">
-                          <a:latin typeface="+mn-ea"/>
-                          <a:ea typeface="+mn-ea"/>
-                          <a:cs typeface="Malgun Gothic"/>
-                          <a:sym typeface="Malgun Gothic"/>
-                        </a:rPr>
-                        <a:t> 일자</a:t>
+                        <a:t>작성자의 아이디</a:t>
                       </a:r>
                       <a:endParaRPr lang="ko" sz="1200" dirty="0">
                         <a:latin typeface="+mn-ea"/>
@@ -7577,7 +7457,165 @@
                       </a:endParaRPr>
                     </a:p>
                   </a:txBody>
-                  <a:tcPr marL="91425" marR="91425" marT="91425" marB="91425"/>
+                  <a:tcPr/>
+                </a:tc>
+                <a:tc>
+                  <a:txBody>
+                    <a:bodyPr/>
+                    <a:lstStyle/>
+                    <a:p>
+                      <a:pPr lvl="0" algn="l">
+                        <a:spcBef>
+                          <a:spcPts val="0"/>
+                        </a:spcBef>
+                        <a:buNone/>
+                      </a:pPr>
+                      <a:r>
+                        <a:rPr lang="ko" sz="1200" dirty="0" smtClean="0">
+                          <a:latin typeface="+mn-ea"/>
+                          <a:ea typeface="+mn-ea"/>
+                          <a:cs typeface="Malgun Gothic"/>
+                          <a:sym typeface="Malgun Gothic"/>
+                        </a:rPr>
+                        <a:t>FK</a:t>
+                      </a:r>
+                      <a:endParaRPr lang="ko" sz="1200" dirty="0">
+                        <a:latin typeface="+mn-ea"/>
+                        <a:ea typeface="+mn-ea"/>
+                        <a:cs typeface="Malgun Gothic"/>
+                        <a:sym typeface="Malgun Gothic"/>
+                      </a:endParaRPr>
+                    </a:p>
+                  </a:txBody>
+                  <a:tcPr/>
+                </a:tc>
+              </a:tr>
+              <a:tr h="289560">
+                <a:tc>
+                  <a:txBody>
+                    <a:bodyPr/>
+                    <a:lstStyle/>
+                    <a:p>
+                      <a:pPr lvl="0" algn="l">
+                        <a:spcBef>
+                          <a:spcPts val="0"/>
+                        </a:spcBef>
+                        <a:buNone/>
+                      </a:pPr>
+                      <a:r>
+                        <a:rPr lang="en-US" altLang="ko" sz="1200" dirty="0" smtClean="0">
+                          <a:latin typeface="+mn-ea"/>
+                          <a:ea typeface="+mn-ea"/>
+                          <a:cs typeface="Malgun Gothic"/>
+                          <a:sym typeface="Malgun Gothic"/>
+                        </a:rPr>
+                        <a:t>board_writ_date</a:t>
+                      </a:r>
+                      <a:endParaRPr lang="ko" sz="1200" dirty="0">
+                        <a:latin typeface="+mn-ea"/>
+                        <a:ea typeface="+mn-ea"/>
+                        <a:cs typeface="Malgun Gothic"/>
+                        <a:sym typeface="Malgun Gothic"/>
+                      </a:endParaRPr>
+                    </a:p>
+                  </a:txBody>
+                  <a:tcPr/>
+                </a:tc>
+                <a:tc>
+                  <a:txBody>
+                    <a:bodyPr/>
+                    <a:lstStyle/>
+                    <a:p>
+                      <a:pPr lvl="0" algn="l" rtl="0">
+                        <a:spcBef>
+                          <a:spcPts val="0"/>
+                        </a:spcBef>
+                        <a:buNone/>
+                      </a:pPr>
+                      <a:r>
+                        <a:rPr lang="en-US" altLang="ko" sz="1200" dirty="0" smtClean="0">
+                          <a:latin typeface="+mn-ea"/>
+                          <a:ea typeface="+mn-ea"/>
+                          <a:cs typeface="Malgun Gothic"/>
+                          <a:sym typeface="Malgun Gothic"/>
+                        </a:rPr>
+                        <a:t>d</a:t>
+                      </a:r>
+                      <a:r>
+                        <a:rPr lang="ko" sz="1200" dirty="0" smtClean="0">
+                          <a:latin typeface="+mn-ea"/>
+                          <a:ea typeface="+mn-ea"/>
+                          <a:cs typeface="Malgun Gothic"/>
+                          <a:sym typeface="Malgun Gothic"/>
+                        </a:rPr>
+                        <a:t>ate</a:t>
+                      </a:r>
+                      <a:endParaRPr lang="ko" sz="1200" dirty="0">
+                        <a:latin typeface="+mn-ea"/>
+                        <a:ea typeface="+mn-ea"/>
+                        <a:cs typeface="Malgun Gothic"/>
+                        <a:sym typeface="Malgun Gothic"/>
+                      </a:endParaRPr>
+                    </a:p>
+                  </a:txBody>
+                  <a:tcPr/>
+                </a:tc>
+                <a:tc>
+                  <a:txBody>
+                    <a:bodyPr/>
+                    <a:lstStyle/>
+                    <a:p>
+                      <a:pPr lvl="0" algn="l" rtl="0">
+                        <a:spcBef>
+                          <a:spcPts val="0"/>
+                        </a:spcBef>
+                        <a:buNone/>
+                      </a:pPr>
+                      <a:r>
+                        <a:rPr lang="ko" sz="1200" dirty="0">
+                          <a:latin typeface="+mn-ea"/>
+                          <a:ea typeface="+mn-ea"/>
+                          <a:cs typeface="Malgun Gothic"/>
+                          <a:sym typeface="Malgun Gothic"/>
+                        </a:rPr>
+                        <a:t>게시글 </a:t>
+                      </a:r>
+                      <a:r>
+                        <a:rPr lang="ko" sz="1200" dirty="0" smtClean="0">
+                          <a:latin typeface="+mn-ea"/>
+                          <a:ea typeface="+mn-ea"/>
+                          <a:cs typeface="Malgun Gothic"/>
+                          <a:sym typeface="Malgun Gothic"/>
+                        </a:rPr>
+                        <a:t>작</a:t>
+                      </a:r>
+                      <a:r>
+                        <a:rPr lang="ko-KR" altLang="en-US" sz="1200" dirty="0" smtClean="0">
+                          <a:latin typeface="+mn-ea"/>
+                          <a:ea typeface="+mn-ea"/>
+                          <a:cs typeface="Malgun Gothic"/>
+                          <a:sym typeface="Malgun Gothic"/>
+                        </a:rPr>
+                        <a:t>성</a:t>
+                      </a:r>
+                      <a:r>
+                        <a:rPr lang="ko-KR" altLang="en-US" sz="1200" baseline="0" dirty="0" smtClean="0">
+                          <a:latin typeface="+mn-ea"/>
+                          <a:ea typeface="+mn-ea"/>
+                          <a:cs typeface="Malgun Gothic"/>
+                          <a:sym typeface="Malgun Gothic"/>
+                        </a:rPr>
+                        <a:t> 일자</a:t>
+                      </a:r>
+                      <a:endParaRPr lang="ko" sz="1200" dirty="0">
+                        <a:latin typeface="+mn-ea"/>
+                        <a:ea typeface="+mn-ea"/>
+                        <a:cs typeface="Malgun Gothic"/>
+                        <a:sym typeface="Malgun Gothic"/>
+                      </a:endParaRPr>
+                    </a:p>
+                  </a:txBody>
+                  <a:tcPr/>
                 </a:tc>
                 <a:tc>
                   <a:txBody>
@@ -7627,10 +7665,10 @@
                       </a:endParaRPr>
                     </a:p>
                   </a:txBody>
-                  <a:tcPr marL="91425" marR="91425" marT="91425" marB="91425"/>
+                  <a:tcPr/>
                 </a:tc>
               </a:tr>
-              <a:tr h="360000">
+              <a:tr h="289560">
                 <a:tc>
                   <a:txBody>
                     <a:bodyPr/>
@@ -7659,7 +7697,7 @@
                       </a:endParaRPr>
                     </a:p>
                   </a:txBody>
-                  <a:tcPr marL="91425" marR="91425" marT="91425" marB="91425"/>
+                  <a:tcPr/>
                 </a:tc>
                 <a:tc>
                   <a:txBody>
@@ -7689,7 +7727,7 @@
                       </a:endParaRPr>
                     </a:p>
                   </a:txBody>
-                  <a:tcPr marL="91425" marR="91425" marT="91425" marB="91425"/>
+                  <a:tcPr/>
                 </a:tc>
                 <a:tc>
                   <a:txBody>
@@ -7719,7 +7757,7 @@
                       </a:endParaRPr>
                     </a:p>
                   </a:txBody>
-                  <a:tcPr marL="91425" marR="91425" marT="91425" marB="91425"/>
+                  <a:tcPr/>
                 </a:tc>
                 <a:tc>
                   <a:txBody>
@@ -7769,10 +7807,10 @@
                       </a:endParaRPr>
                     </a:p>
                   </a:txBody>
-                  <a:tcPr marL="91425" marR="91425" marT="91425" marB="91425"/>
+                  <a:tcPr/>
                 </a:tc>
               </a:tr>
-              <a:tr h="360000">
+              <a:tr h="289560">
                 <a:tc>
                   <a:txBody>
                     <a:bodyPr/>
@@ -7801,7 +7839,7 @@
                       </a:endParaRPr>
                     </a:p>
                   </a:txBody>
-                  <a:tcPr marL="91425" marR="91425" marT="91425" marB="91425"/>
+                  <a:tcPr/>
                 </a:tc>
                 <a:tc>
                   <a:txBody>
@@ -7831,7 +7869,7 @@
                       </a:endParaRPr>
                     </a:p>
                   </a:txBody>
-                  <a:tcPr marL="91425" marR="91425" marT="91425" marB="91425"/>
+                  <a:tcPr/>
                 </a:tc>
                 <a:tc>
                   <a:txBody>
@@ -7861,7 +7899,7 @@
                       </a:endParaRPr>
                     </a:p>
                   </a:txBody>
-                  <a:tcPr marL="91425" marR="91425" marT="91425" marB="91425"/>
+                  <a:tcPr/>
                 </a:tc>
                 <a:tc>
                   <a:txBody>
@@ -7882,10 +7920,10 @@
                       </a:endParaRPr>
                     </a:p>
                   </a:txBody>
-                  <a:tcPr marL="91425" marR="91425" marT="91425" marB="91425"/>
+                  <a:tcPr/>
                 </a:tc>
               </a:tr>
-              <a:tr h="360000">
+              <a:tr h="289560">
                 <a:tc>
                   <a:txBody>
                     <a:bodyPr/>
@@ -7914,7 +7952,7 @@
                       </a:endParaRPr>
                     </a:p>
                   </a:txBody>
-                  <a:tcPr marL="91425" marR="91425" marT="91425" marB="91425"/>
+                  <a:tcPr/>
                 </a:tc>
                 <a:tc>
                   <a:txBody>
@@ -7944,7 +7982,7 @@
                       </a:endParaRPr>
                     </a:p>
                   </a:txBody>
-                  <a:tcPr marL="91425" marR="91425" marT="91425" marB="91425"/>
+                  <a:tcPr/>
                 </a:tc>
                 <a:tc>
                   <a:txBody>
@@ -7974,7 +8012,7 @@
                       </a:endParaRPr>
                     </a:p>
                   </a:txBody>
-                  <a:tcPr marL="91425" marR="91425" marT="91425" marB="91425"/>
+                  <a:tcPr/>
                 </a:tc>
                 <a:tc>
                   <a:txBody>
@@ -8004,10 +8042,10 @@
                       </a:endParaRPr>
                     </a:p>
                   </a:txBody>
-                  <a:tcPr marL="91425" marR="91425" marT="91425" marB="91425"/>
+                  <a:tcPr/>
                 </a:tc>
               </a:tr>
-              <a:tr h="360000">
+              <a:tr h="289560">
                 <a:tc>
                   <a:txBody>
                     <a:bodyPr/>
@@ -8036,7 +8074,7 @@
                       </a:endParaRPr>
                     </a:p>
                   </a:txBody>
-                  <a:tcPr marL="91425" marR="91425" marT="91425" marB="91425"/>
+                  <a:tcPr/>
                 </a:tc>
                 <a:tc>
                   <a:txBody>
@@ -8066,7 +8104,7 @@
                       </a:endParaRPr>
                     </a:p>
                   </a:txBody>
-                  <a:tcPr marL="91425" marR="91425" marT="91425" marB="91425"/>
+                  <a:tcPr/>
                 </a:tc>
                 <a:tc>
                   <a:txBody>
@@ -8105,7 +8143,7 @@
                       </a:endParaRPr>
                     </a:p>
                   </a:txBody>
-                  <a:tcPr marL="91425" marR="91425" marT="91425" marB="91425"/>
+                  <a:tcPr/>
                 </a:tc>
                 <a:tc>
                   <a:txBody>
@@ -8126,10 +8164,10 @@
                       </a:endParaRPr>
                     </a:p>
                   </a:txBody>
-                  <a:tcPr marL="91425" marR="91425" marT="91425" marB="91425"/>
+                  <a:tcPr/>
                 </a:tc>
               </a:tr>
-              <a:tr h="360000">
+              <a:tr h="289560">
                 <a:tc>
                   <a:txBody>
                     <a:bodyPr/>
@@ -8158,7 +8196,7 @@
                       </a:endParaRPr>
                     </a:p>
                   </a:txBody>
-                  <a:tcPr marL="91425" marR="91425" marT="91425" marB="91425"/>
+                  <a:tcPr/>
                 </a:tc>
                 <a:tc>
                   <a:txBody>
@@ -8188,7 +8226,7 @@
                       </a:endParaRPr>
                     </a:p>
                   </a:txBody>
-                  <a:tcPr marL="91425" marR="91425" marT="91425" marB="91425"/>
+                  <a:tcPr/>
                 </a:tc>
                 <a:tc>
                   <a:txBody>
@@ -8218,7 +8256,7 @@
                       </a:endParaRPr>
                     </a:p>
                   </a:txBody>
-                  <a:tcPr marL="91425" marR="91425" marT="91425" marB="91425"/>
+                  <a:tcPr/>
                 </a:tc>
                 <a:tc>
                   <a:txBody>
@@ -8257,10 +8295,10 @@
                       </a:endParaRPr>
                     </a:p>
                   </a:txBody>
-                  <a:tcPr marL="91425" marR="91425" marT="91425" marB="91425"/>
+                  <a:tcPr/>
                 </a:tc>
               </a:tr>
-              <a:tr h="360000">
+              <a:tr h="289560">
                 <a:tc>
                   <a:txBody>
                     <a:bodyPr/>
@@ -8289,7 +8327,7 @@
                       </a:endParaRPr>
                     </a:p>
                   </a:txBody>
-                  <a:tcPr marL="91425" marR="91425" marT="91425" marB="91425"/>
+                  <a:tcPr/>
                 </a:tc>
                 <a:tc>
                   <a:txBody>
@@ -8319,7 +8357,7 @@
                       </a:endParaRPr>
                     </a:p>
                   </a:txBody>
-                  <a:tcPr marL="91425" marR="91425" marT="91425" marB="91425"/>
+                  <a:tcPr/>
                 </a:tc>
                 <a:tc>
                   <a:txBody>
@@ -8349,7 +8387,7 @@
                       </a:endParaRPr>
                     </a:p>
                   </a:txBody>
-                  <a:tcPr marL="91425" marR="91425" marT="91425" marB="91425"/>
+                  <a:tcPr/>
                 </a:tc>
                 <a:tc>
                   <a:txBody>
@@ -8379,7 +8417,165 @@
                       </a:endParaRPr>
                     </a:p>
                   </a:txBody>
-                  <a:tcPr marL="91425" marR="91425" marT="91425" marB="91425"/>
+                  <a:tcPr/>
+                </a:tc>
+              </a:tr>
+              <a:tr h="289560">
+                <a:tc>
+                  <a:txBody>
+                    <a:bodyPr/>
+                    <a:lstStyle/>
+                    <a:p>
+                      <a:pPr lvl="0" algn="l">
+                        <a:spcBef>
+                          <a:spcPts val="0"/>
+                        </a:spcBef>
+                        <a:buNone/>
+                      </a:pPr>
+                      <a:r>
+                        <a:rPr lang="en-US" altLang="ko" sz="1200" dirty="0" smtClean="0">
+                          <a:latin typeface="+mn-ea"/>
+                          <a:ea typeface="+mn-ea"/>
+                          <a:cs typeface="Malgun Gothic"/>
+                          <a:sym typeface="Malgun Gothic"/>
+                        </a:rPr>
+                        <a:t>depth</a:t>
+                      </a:r>
+                      <a:endParaRPr lang="ko" sz="1200" dirty="0">
+                        <a:latin typeface="+mn-ea"/>
+                        <a:ea typeface="+mn-ea"/>
+                        <a:cs typeface="Malgun Gothic"/>
+                        <a:sym typeface="Malgun Gothic"/>
+                      </a:endParaRPr>
+                    </a:p>
+                  </a:txBody>
+                  <a:tcPr/>
+                </a:tc>
+                <a:tc>
+                  <a:txBody>
+                    <a:bodyPr/>
+                    <a:lstStyle/>
+                    <a:p>
+                      <a:pPr lvl="0" algn="l" rtl="0">
+                        <a:spcBef>
+                          <a:spcPts val="0"/>
+                        </a:spcBef>
+                        <a:buNone/>
+                      </a:pPr>
+                      <a:r>
+                        <a:rPr lang="en-US" altLang="ko" sz="1200" dirty="0" smtClean="0">
+                          <a:latin typeface="+mn-ea"/>
+                          <a:ea typeface="+mn-ea"/>
+                          <a:cs typeface="Malgun Gothic"/>
+                          <a:sym typeface="Malgun Gothic"/>
+                        </a:rPr>
+                        <a:t>number</a:t>
+                      </a:r>
+                      <a:endParaRPr lang="ko" sz="1200" dirty="0">
+                        <a:latin typeface="+mn-ea"/>
+                        <a:ea typeface="+mn-ea"/>
+                        <a:cs typeface="Malgun Gothic"/>
+                        <a:sym typeface="Malgun Gothic"/>
+                      </a:endParaRPr>
+                    </a:p>
+                  </a:txBody>
+                  <a:tcPr/>
+                </a:tc>
+                <a:tc>
+                  <a:txBody>
+                    <a:bodyPr/>
+                    <a:lstStyle/>
+                    <a:p>
+                      <a:pPr lvl="0" algn="l" rtl="0">
+                        <a:spcBef>
+                          <a:spcPts val="0"/>
+                        </a:spcBef>
+                        <a:buNone/>
+                      </a:pPr>
+                      <a:r>
+                        <a:rPr lang="ko-KR" altLang="en-US" sz="1200" dirty="0" err="1" smtClean="0">
+                          <a:latin typeface="+mn-ea"/>
+                          <a:ea typeface="+mn-ea"/>
+                          <a:cs typeface="Malgun Gothic"/>
+                          <a:sym typeface="Malgun Gothic"/>
+                        </a:rPr>
+                        <a:t>댓글의</a:t>
+                      </a:r>
+                      <a:r>
+                        <a:rPr lang="ko-KR" altLang="en-US" sz="1200" dirty="0" smtClean="0">
+                          <a:latin typeface="+mn-ea"/>
+                          <a:ea typeface="+mn-ea"/>
+                          <a:cs typeface="Malgun Gothic"/>
+                          <a:sym typeface="Malgun Gothic"/>
+                        </a:rPr>
+                        <a:t> 깊이</a:t>
+                      </a:r>
+                      <a:r>
+                        <a:rPr lang="en-US" altLang="ko-KR" sz="1200" dirty="0" smtClean="0">
+                          <a:latin typeface="+mn-ea"/>
+                          <a:ea typeface="+mn-ea"/>
+                          <a:cs typeface="Malgun Gothic"/>
+                          <a:sym typeface="Malgun Gothic"/>
+                        </a:rPr>
+                        <a:t>(</a:t>
+                      </a:r>
+                      <a:r>
+                        <a:rPr lang="ko-KR" altLang="en-US" sz="1200" dirty="0" smtClean="0">
+                          <a:latin typeface="+mn-ea"/>
+                          <a:ea typeface="+mn-ea"/>
+                          <a:cs typeface="Malgun Gothic"/>
+                          <a:sym typeface="Malgun Gothic"/>
+                        </a:rPr>
+                        <a:t>단</a:t>
+                      </a:r>
+                      <a:r>
+                        <a:rPr lang="en-US" altLang="ko-KR" sz="1200" dirty="0" smtClean="0">
+                          <a:latin typeface="+mn-ea"/>
+                          <a:ea typeface="+mn-ea"/>
+                          <a:cs typeface="Malgun Gothic"/>
+                          <a:sym typeface="Malgun Gothic"/>
+                        </a:rPr>
+                        <a:t>)</a:t>
+                      </a:r>
+                      <a:endParaRPr lang="ko" sz="1200" dirty="0">
+                        <a:latin typeface="+mn-ea"/>
+                        <a:ea typeface="+mn-ea"/>
+                        <a:cs typeface="Malgun Gothic"/>
+                        <a:sym typeface="Malgun Gothic"/>
+                      </a:endParaRPr>
+                    </a:p>
+                  </a:txBody>
+                  <a:tcPr/>
+                </a:tc>
+                <a:tc>
+                  <a:txBody>
+                    <a:bodyPr/>
+                    <a:lstStyle/>
+                    <a:p>
+                      <a:pPr lvl="0" algn="l">
+                        <a:spcBef>
+                          <a:spcPts val="0"/>
+                        </a:spcBef>
+                        <a:buNone/>
+                      </a:pPr>
+                      <a:r>
+                        <a:rPr lang="en-US" altLang="ko" sz="1200" dirty="0" smtClean="0">
+                          <a:latin typeface="+mn-ea"/>
+                          <a:ea typeface="+mn-ea"/>
+                          <a:cs typeface="Malgun Gothic"/>
+                          <a:sym typeface="Malgun Gothic"/>
+                        </a:rPr>
+                        <a:t>default 0</a:t>
+                      </a:r>
+                      <a:endParaRPr lang="ko" sz="1200" dirty="0">
+                        <a:latin typeface="+mn-ea"/>
+                        <a:ea typeface="+mn-ea"/>
+                        <a:cs typeface="Malgun Gothic"/>
+                        <a:sym typeface="Malgun Gothic"/>
+                      </a:endParaRPr>
+                    </a:p>
+                  </a:txBody>
+                  <a:tcPr/>
                 </a:tc>
               </a:tr>
             </a:tbl>
@@ -8422,6 +8618,10 @@
           </p:nvPr>
         </p:nvSpPr>
         <p:spPr>
+          <a:xfrm>
+            <a:off x="311700" y="51470"/>
+            <a:ext cx="8520600" cy="572700"/>
+          </a:xfrm>
           <a:prstGeom prst="rect">
             <a:avLst/>
           </a:prstGeom>
@@ -8438,30 +8638,6 @@
               </a:spcBef>
               <a:buNone/>
             </a:pPr>
-            <a:r>
-              <a:rPr lang="ko" b="1" dirty="0">
-                <a:solidFill>
-                  <a:srgbClr val="00B050"/>
-                </a:solidFill>
-                <a:latin typeface="Malgun Gothic"/>
-                <a:ea typeface="Malgun Gothic"/>
-                <a:cs typeface="Malgun Gothic"/>
-                <a:sym typeface="Malgun Gothic"/>
-              </a:rPr>
-              <a:t>테이블 명세</a:t>
-            </a:r>
-            <a:r>
-              <a:rPr lang="ko" b="1" dirty="0" smtClean="0">
-                <a:solidFill>
-                  <a:srgbClr val="00B050"/>
-                </a:solidFill>
-                <a:latin typeface="Malgun Gothic"/>
-                <a:ea typeface="Malgun Gothic"/>
-                <a:cs typeface="Malgun Gothic"/>
-                <a:sym typeface="Malgun Gothic"/>
-              </a:rPr>
-              <a:t>(</a:t>
-            </a:r>
             <a:r>
               <a:rPr lang="en-US" altLang="ko" b="1" dirty="0" smtClean="0">
                 <a:solidFill>
@@ -8474,18 +8650,6 @@
               </a:rPr>
               <a:t>Mountain</a:t>
             </a:r>
-            <a:r>
-              <a:rPr lang="ko" b="1" dirty="0" smtClean="0">
-                <a:solidFill>
-                  <a:srgbClr val="00B050"/>
-                </a:solidFill>
-                <a:latin typeface="Malgun Gothic"/>
-                <a:ea typeface="Malgun Gothic"/>
-                <a:cs typeface="Malgun Gothic"/>
-                <a:sym typeface="Malgun Gothic"/>
-              </a:rPr>
-              <a:t>)</a:t>
-            </a:r>
             <a:endParaRPr lang="ko" b="1" dirty="0">
               <a:solidFill>
                 <a:srgbClr val="00B050"/>
@@ -8505,13 +8669,13 @@
           <p:nvPr>
             <p:extLst>
               <p:ext uri="{D42A27DB-BD31-4B8C-83A1-F6EECF244321}">
-                <p14:modId xmlns:p14="http://schemas.microsoft.com/office/powerpoint/2010/main" val="875088901"/>
+                <p14:modId xmlns:p14="http://schemas.microsoft.com/office/powerpoint/2010/main" val="2591692599"/>
               </p:ext>
             </p:extLst>
           </p:nvPr>
         </p:nvGraphicFramePr>
         <p:xfrm>
-          <a:off x="311700" y="1191075"/>
+          <a:off x="311700" y="914992"/>
           <a:ext cx="8484750" cy="3744990"/>
         </p:xfrm>
         <a:graphic>
@@ -9333,7 +9497,63 @@
                           <a:latin typeface="+mn-ea"/>
                           <a:ea typeface="+mn-ea"/>
                         </a:rPr>
-                        <a:t>산 테마</a:t>
+                        <a:t>산 </a:t>
+                      </a:r>
+                      <a:r>
+                        <a:rPr lang="ko-KR" altLang="en-US" dirty="0" smtClean="0">
+                          <a:latin typeface="+mn-ea"/>
+                          <a:ea typeface="+mn-ea"/>
+                        </a:rPr>
+                        <a:t>테마 </a:t>
+                      </a:r>
+                      <a:r>
+                        <a:rPr lang="en-US" altLang="ko-KR" dirty="0" smtClean="0">
+                          <a:latin typeface="+mn-ea"/>
+                          <a:ea typeface="+mn-ea"/>
+                        </a:rPr>
+                        <a:t>(</a:t>
+                      </a:r>
+                      <a:r>
+                        <a:rPr lang="ko-KR" altLang="en-US" dirty="0" smtClean="0">
+                          <a:latin typeface="+mn-ea"/>
+                          <a:ea typeface="+mn-ea"/>
+                        </a:rPr>
+                        <a:t>지역별 </a:t>
+                      </a:r>
+                      <a:r>
+                        <a:rPr lang="en-US" altLang="ko-KR" dirty="0" smtClean="0">
+                          <a:latin typeface="+mn-ea"/>
+                          <a:ea typeface="+mn-ea"/>
+                        </a:rPr>
+                        <a:t>0, </a:t>
+                      </a:r>
+                      <a:r>
+                        <a:rPr lang="ko-KR" altLang="en-US" dirty="0" smtClean="0">
+                          <a:latin typeface="+mn-ea"/>
+                          <a:ea typeface="+mn-ea"/>
+                        </a:rPr>
+                        <a:t>계절 </a:t>
+                      </a:r>
+                      <a:r>
+                        <a:rPr lang="en-US" altLang="ko-KR" dirty="0" smtClean="0">
+                          <a:latin typeface="+mn-ea"/>
+                          <a:ea typeface="+mn-ea"/>
+                        </a:rPr>
+                        <a:t>1, </a:t>
+                      </a:r>
+                      <a:r>
+                        <a:rPr lang="ko-KR" altLang="en-US" dirty="0" smtClean="0">
+                          <a:latin typeface="+mn-ea"/>
+                          <a:ea typeface="+mn-ea"/>
+                        </a:rPr>
+                        <a:t>꽃</a:t>
+                      </a:r>
+                      <a:r>
+                        <a:rPr lang="en-US" altLang="ko-KR" dirty="0" smtClean="0">
+                          <a:latin typeface="+mn-ea"/>
+                          <a:ea typeface="+mn-ea"/>
+                        </a:rPr>
+                        <a:t> 2)</a:t>
                       </a:r>
                       <a:endParaRPr lang="ko" dirty="0">
                         <a:latin typeface="+mn-ea"/>
@@ -9420,31 +9640,7 @@
               <a:buNone/>
             </a:pPr>
             <a:r>
-              <a:rPr lang="ko" b="1" dirty="0">
-                <a:solidFill>
-                  <a:srgbClr val="00B050"/>
-                </a:solidFill>
-                <a:latin typeface="Malgun Gothic"/>
-                <a:ea typeface="Malgun Gothic"/>
-                <a:cs typeface="Malgun Gothic"/>
-                <a:sym typeface="Malgun Gothic"/>
-              </a:rPr>
-              <a:t>테이블 명세</a:t>
-            </a:r>
-            <a:r>
-              <a:rPr lang="ko" b="1" dirty="0" smtClean="0">
-                <a:solidFill>
-                  <a:srgbClr val="00B050"/>
-                </a:solidFill>
-                <a:latin typeface="Malgun Gothic"/>
-                <a:ea typeface="Malgun Gothic"/>
-                <a:cs typeface="Malgun Gothic"/>
-                <a:sym typeface="Malgun Gothic"/>
-              </a:rPr>
-              <a:t>(</a:t>
-            </a:r>
-            <a:r>
-              <a:rPr lang="en-US" altLang="ko" b="1" dirty="0" smtClean="0">
+              <a:rPr lang="en-US" altLang="ko" b="1" dirty="0" err="1" smtClean="0">
                 <a:solidFill>
                   <a:srgbClr val="00B050"/>
                 </a:solidFill>
@@ -9455,18 +9651,6 @@
               </a:rPr>
               <a:t>Mountain_history</a:t>
             </a:r>
-            <a:r>
-              <a:rPr lang="ko" b="1" dirty="0" smtClean="0">
-                <a:solidFill>
-                  <a:srgbClr val="00B050"/>
-                </a:solidFill>
-                <a:latin typeface="Malgun Gothic"/>
-                <a:ea typeface="Malgun Gothic"/>
-                <a:cs typeface="Malgun Gothic"/>
-                <a:sym typeface="Malgun Gothic"/>
-              </a:rPr>
-              <a:t>)</a:t>
-            </a:r>
             <a:endParaRPr lang="ko" b="1" dirty="0">
               <a:solidFill>
                 <a:srgbClr val="00B050"/>
@@ -9486,7 +9670,7 @@
           <p:nvPr>
             <p:extLst>
               <p:ext uri="{D42A27DB-BD31-4B8C-83A1-F6EECF244321}">
-                <p14:modId xmlns:p14="http://schemas.microsoft.com/office/powerpoint/2010/main" val="1162226098"/>
+                <p14:modId xmlns:p14="http://schemas.microsoft.com/office/powerpoint/2010/main" val="2149489019"/>
               </p:ext>
             </p:extLst>
           </p:nvPr>
@@ -10017,13 +10201,6 @@
                         </a:spcBef>
                         <a:buNone/>
                       </a:pPr>
-                      <a:r>
-                        <a:rPr lang="en-US" dirty="0" smtClean="0">
-                          <a:latin typeface="+mn-ea"/>
-                          <a:ea typeface="+mn-ea"/>
-                        </a:rPr>
-                        <a:t>PK</a:t>
-                      </a:r>
                       <a:endParaRPr dirty="0">
                         <a:latin typeface="+mn-ea"/>
                         <a:ea typeface="+mn-ea"/>
@@ -10095,30 +10272,6 @@
               <a:buNone/>
             </a:pPr>
             <a:r>
-              <a:rPr lang="ko" b="1" dirty="0">
-                <a:solidFill>
-                  <a:srgbClr val="00B050"/>
-                </a:solidFill>
-                <a:latin typeface="Malgun Gothic"/>
-                <a:ea typeface="Malgun Gothic"/>
-                <a:cs typeface="Malgun Gothic"/>
-                <a:sym typeface="Malgun Gothic"/>
-              </a:rPr>
-              <a:t>테이블 명세</a:t>
-            </a:r>
-            <a:r>
-              <a:rPr lang="ko" b="1" dirty="0" smtClean="0">
-                <a:solidFill>
-                  <a:srgbClr val="00B050"/>
-                </a:solidFill>
-                <a:latin typeface="Malgun Gothic"/>
-                <a:ea typeface="Malgun Gothic"/>
-                <a:cs typeface="Malgun Gothic"/>
-                <a:sym typeface="Malgun Gothic"/>
-              </a:rPr>
-              <a:t>(</a:t>
-            </a:r>
-            <a:r>
               <a:rPr lang="en-US" altLang="ko" b="1" dirty="0" smtClean="0">
                 <a:solidFill>
                   <a:srgbClr val="00B050"/>
@@ -10130,18 +10283,6 @@
               </a:rPr>
               <a:t>Title</a:t>
             </a:r>
-            <a:r>
-              <a:rPr lang="ko" b="1" dirty="0" smtClean="0">
-                <a:solidFill>
-                  <a:srgbClr val="00B050"/>
-                </a:solidFill>
-                <a:latin typeface="Malgun Gothic"/>
-                <a:ea typeface="Malgun Gothic"/>
-                <a:cs typeface="Malgun Gothic"/>
-                <a:sym typeface="Malgun Gothic"/>
-              </a:rPr>
-              <a:t>)</a:t>
-            </a:r>
             <a:endParaRPr lang="ko" b="1" dirty="0">
               <a:solidFill>
                 <a:srgbClr val="00B050"/>
@@ -10161,7 +10302,7 @@
           <p:nvPr>
             <p:extLst>
               <p:ext uri="{D42A27DB-BD31-4B8C-83A1-F6EECF244321}">
-                <p14:modId xmlns:p14="http://schemas.microsoft.com/office/powerpoint/2010/main" val="2741645563"/>
+                <p14:modId xmlns:p14="http://schemas.microsoft.com/office/powerpoint/2010/main" val="2552008418"/>
               </p:ext>
             </p:extLst>
           </p:nvPr>
@@ -10178,9 +10319,9 @@
                 <a:tableStyleId>{A8E86F9E-798B-427F-8E33-9167125B3FD2}</a:tableStyleId>
               </a:tblPr>
               <a:tblGrid>
-                <a:gridCol w="2244076"/>
-                <a:gridCol w="1728192"/>
-                <a:gridCol w="3528392"/>
+                <a:gridCol w="1668012"/>
+                <a:gridCol w="1944216"/>
+                <a:gridCol w="3888432"/>
                 <a:gridCol w="984090"/>
               </a:tblGrid>
               <a:tr h="526625">
@@ -10196,7 +10337,7 @@
                         <a:buNone/>
                       </a:pPr>
                       <a:r>
-                        <a:rPr lang="ko" sz="1800" dirty="0">
+                        <a:rPr lang="ko" sz="1500" dirty="0">
                           <a:latin typeface="+mn-ea"/>
                           <a:ea typeface="+mn-ea"/>
                         </a:rPr>
@@ -10218,7 +10359,7 @@
                         <a:buNone/>
                       </a:pPr>
                       <a:r>
-                        <a:rPr lang="ko" sz="1800">
+                        <a:rPr lang="ko" sz="1500" dirty="0">
                           <a:latin typeface="+mn-ea"/>
                           <a:ea typeface="+mn-ea"/>
                         </a:rPr>
@@ -10240,7 +10381,7 @@
                         <a:buNone/>
                       </a:pPr>
                       <a:r>
-                        <a:rPr lang="ko" sz="1800">
+                        <a:rPr lang="ko" sz="1500">
                           <a:latin typeface="+mn-ea"/>
                           <a:ea typeface="+mn-ea"/>
                         </a:rPr>
@@ -10262,7 +10403,7 @@
                         <a:buNone/>
                       </a:pPr>
                       <a:r>
-                        <a:rPr lang="ko" sz="1800">
+                        <a:rPr lang="ko" sz="1500">
                           <a:latin typeface="+mn-ea"/>
                           <a:ea typeface="+mn-ea"/>
                         </a:rPr>
@@ -10286,13 +10427,13 @@
                         <a:buNone/>
                       </a:pPr>
                       <a:r>
-                        <a:rPr lang="en-US" altLang="ko" dirty="0" smtClean="0">
+                        <a:rPr lang="en-US" altLang="ko" sz="1400" dirty="0" smtClean="0">
                           <a:latin typeface="+mn-ea"/>
                           <a:ea typeface="+mn-ea"/>
                         </a:rPr>
                         <a:t>title_no</a:t>
                       </a:r>
-                      <a:endParaRPr lang="ko" dirty="0">
+                      <a:endParaRPr lang="ko" sz="1400" dirty="0">
                         <a:latin typeface="+mn-ea"/>
                         <a:ea typeface="+mn-ea"/>
                       </a:endParaRPr>
@@ -10312,13 +10453,13 @@
                         <a:buNone/>
                       </a:pPr>
                       <a:r>
-                        <a:rPr lang="en-US" altLang="ko" dirty="0" smtClean="0">
+                        <a:rPr lang="en-US" altLang="ko" sz="1400" dirty="0" smtClean="0">
                           <a:latin typeface="+mn-ea"/>
                           <a:ea typeface="+mn-ea"/>
                         </a:rPr>
                         <a:t>number</a:t>
                       </a:r>
-                      <a:endParaRPr lang="ko" dirty="0">
+                      <a:endParaRPr lang="ko" sz="1400" dirty="0">
                         <a:latin typeface="+mn-ea"/>
                         <a:ea typeface="+mn-ea"/>
                       </a:endParaRPr>
@@ -10338,13 +10479,13 @@
                         <a:buNone/>
                       </a:pPr>
                       <a:r>
-                        <a:rPr lang="ko-KR" altLang="en-US" dirty="0" smtClean="0">
+                        <a:rPr lang="ko-KR" altLang="en-US" sz="1400" dirty="0" smtClean="0">
                           <a:latin typeface="+mn-ea"/>
                           <a:ea typeface="+mn-ea"/>
                         </a:rPr>
                         <a:t>타이틀 관리번호</a:t>
                       </a:r>
-                      <a:endParaRPr lang="ko" dirty="0">
+                      <a:endParaRPr lang="ko" sz="1400" dirty="0">
                         <a:latin typeface="+mn-ea"/>
                         <a:ea typeface="+mn-ea"/>
                       </a:endParaRPr>
@@ -10375,13 +10516,13 @@
                         <a:defRPr/>
                       </a:pPr>
                       <a:r>
-                        <a:rPr lang="en-US" dirty="0" smtClean="0">
+                        <a:rPr lang="en-US" sz="1400" dirty="0" smtClean="0">
                           <a:latin typeface="+mn-ea"/>
                           <a:ea typeface="+mn-ea"/>
                         </a:rPr>
                         <a:t>PK</a:t>
                       </a:r>
-                      <a:endParaRPr dirty="0">
+                      <a:endParaRPr sz="1400" dirty="0">
                         <a:latin typeface="+mn-ea"/>
                         <a:ea typeface="+mn-ea"/>
                       </a:endParaRPr>
@@ -10403,13 +10544,13 @@
                         <a:buNone/>
                       </a:pPr>
                       <a:r>
-                        <a:rPr lang="en-US" altLang="ko" dirty="0" smtClean="0">
+                        <a:rPr lang="en-US" altLang="ko" sz="1400" dirty="0" smtClean="0">
                           <a:latin typeface="+mn-ea"/>
                           <a:ea typeface="+mn-ea"/>
                         </a:rPr>
                         <a:t>title_name</a:t>
                       </a:r>
-                      <a:endParaRPr lang="ko" dirty="0">
+                      <a:endParaRPr lang="ko" sz="1400" dirty="0">
                         <a:latin typeface="+mn-ea"/>
                         <a:ea typeface="+mn-ea"/>
                       </a:endParaRPr>
@@ -10429,13 +10570,13 @@
                         <a:buNone/>
                       </a:pPr>
                       <a:r>
-                        <a:rPr lang="en-US" altLang="ko" dirty="0" smtClean="0">
+                        <a:rPr lang="en-US" altLang="ko" sz="1400" dirty="0" smtClean="0">
                           <a:latin typeface="+mn-ea"/>
                           <a:ea typeface="+mn-ea"/>
                         </a:rPr>
                         <a:t>varchar2(30)</a:t>
                       </a:r>
-                      <a:endParaRPr lang="ko" dirty="0">
+                      <a:endParaRPr lang="ko" sz="1400" dirty="0">
                         <a:latin typeface="+mn-ea"/>
                         <a:ea typeface="+mn-ea"/>
                       </a:endParaRPr>
@@ -10455,13 +10596,13 @@
                         <a:buNone/>
                       </a:pPr>
                       <a:r>
-                        <a:rPr lang="ko-KR" altLang="en-US" dirty="0" smtClean="0">
+                        <a:rPr lang="ko-KR" altLang="en-US" sz="1400" dirty="0" smtClean="0">
                           <a:latin typeface="+mn-ea"/>
                           <a:ea typeface="+mn-ea"/>
                         </a:rPr>
                         <a:t>타이틀 이름</a:t>
                       </a:r>
-                      <a:endParaRPr lang="ko" dirty="0">
+                      <a:endParaRPr lang="ko" sz="1400" dirty="0">
                         <a:latin typeface="+mn-ea"/>
                         <a:ea typeface="+mn-ea"/>
                       </a:endParaRPr>
@@ -10480,7 +10621,7 @@
                         </a:spcBef>
                         <a:buNone/>
                       </a:pPr>
-                      <a:endParaRPr lang="ko" dirty="0">
+                      <a:endParaRPr lang="ko" sz="1400" dirty="0">
                         <a:latin typeface="+mn-ea"/>
                         <a:ea typeface="+mn-ea"/>
                       </a:endParaRPr>
@@ -10502,13 +10643,13 @@
                         <a:buNone/>
                       </a:pPr>
                       <a:r>
-                        <a:rPr lang="en-US" altLang="ko" dirty="0" smtClean="0">
+                        <a:rPr lang="en-US" altLang="ko" sz="1400" dirty="0" smtClean="0">
                           <a:latin typeface="+mn-ea"/>
                           <a:ea typeface="+mn-ea"/>
                         </a:rPr>
                         <a:t>title_condition</a:t>
                       </a:r>
-                      <a:endParaRPr lang="ko" dirty="0">
+                      <a:endParaRPr lang="ko" sz="1400" dirty="0">
                         <a:latin typeface="+mn-ea"/>
                         <a:ea typeface="+mn-ea"/>
                       </a:endParaRPr>
@@ -10528,13 +10669,13 @@
                         <a:buNone/>
                       </a:pPr>
                       <a:r>
-                        <a:rPr lang="en-US" altLang="ko" dirty="0" smtClean="0">
+                        <a:rPr lang="en-US" altLang="ko" sz="1400" dirty="0" smtClean="0">
                           <a:latin typeface="+mn-ea"/>
                           <a:ea typeface="+mn-ea"/>
                         </a:rPr>
                         <a:t>varchar2(60)</a:t>
                       </a:r>
-                      <a:endParaRPr lang="ko" dirty="0">
+                      <a:endParaRPr lang="ko" sz="1400" dirty="0">
                         <a:latin typeface="+mn-ea"/>
                         <a:ea typeface="+mn-ea"/>
                       </a:endParaRPr>
@@ -10554,13 +10695,69 @@
                         <a:buNone/>
                       </a:pPr>
                       <a:r>
-                        <a:rPr lang="ko-KR" altLang="en-US" dirty="0" smtClean="0">
-                          <a:latin typeface="+mn-ea"/>
-                          <a:ea typeface="+mn-ea"/>
-                        </a:rPr>
-                        <a:t>타이틀 조건</a:t>
-                      </a:r>
-                      <a:endParaRPr lang="ko" dirty="0">
+                        <a:rPr lang="ko-KR" altLang="en-US" sz="1400" dirty="0" smtClean="0">
+                          <a:latin typeface="+mn-ea"/>
+                          <a:ea typeface="+mn-ea"/>
+                        </a:rPr>
+                        <a:t>타이틀 </a:t>
+                      </a:r>
+                      <a:r>
+                        <a:rPr lang="ko-KR" altLang="en-US" sz="1400" dirty="0" smtClean="0">
+                          <a:latin typeface="+mn-ea"/>
+                          <a:ea typeface="+mn-ea"/>
+                        </a:rPr>
+                        <a:t>조건</a:t>
+                      </a:r>
+                      <a:r>
+                        <a:rPr lang="en-US" altLang="ko-KR" sz="1400" dirty="0" smtClean="0">
+                          <a:latin typeface="+mn-ea"/>
+                          <a:ea typeface="+mn-ea"/>
+                        </a:rPr>
+                        <a:t>( </a:t>
+                      </a:r>
+                      <a:r>
+                        <a:rPr lang="ko-KR" altLang="en-US" sz="1400" dirty="0" err="1" smtClean="0">
+                          <a:latin typeface="+mn-ea"/>
+                          <a:ea typeface="+mn-ea"/>
+                        </a:rPr>
+                        <a:t>구분자</a:t>
+                      </a:r>
+                      <a:r>
+                        <a:rPr lang="en-US" altLang="ko-KR" sz="1400" baseline="0" dirty="0" smtClean="0">
+                          <a:latin typeface="+mn-ea"/>
+                          <a:ea typeface="+mn-ea"/>
+                        </a:rPr>
+                        <a:t>=“,” </a:t>
+                      </a:r>
+                      <a:r>
+                        <a:rPr lang="ko-KR" altLang="en-US" sz="1400" baseline="0" dirty="0" smtClean="0">
+                          <a:latin typeface="+mn-ea"/>
+                          <a:ea typeface="+mn-ea"/>
+                        </a:rPr>
+                        <a:t>값</a:t>
+                      </a:r>
+                      <a:r>
+                        <a:rPr lang="en-US" altLang="ko-KR" sz="1400" baseline="0" dirty="0" smtClean="0">
+                          <a:latin typeface="+mn-ea"/>
+                          <a:ea typeface="+mn-ea"/>
+                        </a:rPr>
+                        <a:t>=“</a:t>
+                      </a:r>
+                      <a:r>
+                        <a:rPr lang="en-US" altLang="ko-KR" sz="1400" baseline="0" dirty="0" err="1" smtClean="0">
+                          <a:latin typeface="+mn-ea"/>
+                          <a:ea typeface="+mn-ea"/>
+                        </a:rPr>
+                        <a:t>mountain_no</a:t>
+                      </a:r>
+                      <a:r>
+                        <a:rPr lang="en-US" altLang="ko-KR" sz="1400" baseline="0" dirty="0" smtClean="0">
+                          <a:latin typeface="+mn-ea"/>
+                          <a:ea typeface="+mn-ea"/>
+                        </a:rPr>
+                        <a:t>”)</a:t>
+                      </a:r>
+                      <a:endParaRPr lang="ko" sz="1400" dirty="0">
                         <a:latin typeface="+mn-ea"/>
                         <a:ea typeface="+mn-ea"/>
                       </a:endParaRPr>
@@ -10579,7 +10776,7 @@
                         </a:spcBef>
                         <a:buNone/>
                       </a:pPr>
-                      <a:endParaRPr lang="ko" dirty="0">
+                      <a:endParaRPr lang="ko" sz="1400" dirty="0">
                         <a:latin typeface="+mn-ea"/>
                         <a:ea typeface="+mn-ea"/>
                       </a:endParaRPr>

</xml_diff>

<commit_message>
ppt 수정 (최신 테이블 컬럼 반영) history빈 mountain_name 속성(컬럼)추가 historyDao 수정(select문만)
</commit_message>
<xml_diff>
--- a/WebContent/common/5조.YamaManProject.pptx
+++ b/WebContent/common/5조.YamaManProject.pptx
@@ -1,6 +1,6 @@
 
 <file path=ppt/presentation.xml><?xml version="1.0" encoding="utf-8"?>
-<p:presentation xmlns:a="http://schemas.openxmlformats.org/drawingml/2006/main" xmlns:r="http://schemas.openxmlformats.org/officeDocument/2006/relationships" xmlns:p="http://schemas.openxmlformats.org/presentationml/2006/main" strictFirstAndLastChars="0" embedTrueTypeFonts="1" saveSubsetFonts="1" autoCompressPictures="0">
+<p:presentation xmlns:a="http://schemas.openxmlformats.org/drawingml/2006/main" xmlns:r="http://schemas.openxmlformats.org/officeDocument/2006/relationships" xmlns:p="http://schemas.openxmlformats.org/presentationml/2006/main" serverZoom="30057" strictFirstAndLastChars="0" embedTrueTypeFonts="1" saveSubsetFonts="1" autoCompressPictures="0">
   <p:sldMasterIdLst>
     <p:sldMasterId id="2147483660" r:id="rId1"/>
   </p:sldMasterIdLst>
@@ -9644,14 +9644,14 @@
           <p:nvPr>
             <p:extLst>
               <p:ext uri="{D42A27DB-BD31-4B8C-83A1-F6EECF244321}">
-                <p14:modId xmlns:p14="http://schemas.microsoft.com/office/powerpoint/2010/main" val="935983298"/>
+                <p14:modId xmlns:p14="http://schemas.microsoft.com/office/powerpoint/2010/main" val="2054373360"/>
               </p:ext>
             </p:extLst>
           </p:nvPr>
         </p:nvGraphicFramePr>
         <p:xfrm>
           <a:off x="311700" y="1191075"/>
-          <a:ext cx="8484750" cy="2705825"/>
+          <a:ext cx="8484750" cy="3250625"/>
         </p:xfrm>
         <a:graphic>
           <a:graphicData uri="http://schemas.openxmlformats.org/drawingml/2006/table">
@@ -10155,6 +10155,105 @@
                           <a:ea typeface="+mn-ea"/>
                         </a:rPr>
                         <a:t>등산 날짜</a:t>
+                      </a:r>
+                      <a:endParaRPr lang="ko" dirty="0">
+                        <a:latin typeface="+mn-ea"/>
+                        <a:ea typeface="+mn-ea"/>
+                      </a:endParaRPr>
+                    </a:p>
+                  </a:txBody>
+                  <a:tcPr marL="91425" marR="91425" marT="91425" marB="91425"/>
+                </a:tc>
+                <a:tc>
+                  <a:txBody>
+                    <a:bodyPr/>
+                    <a:lstStyle/>
+                    <a:p>
+                      <a:pPr lvl="0" rtl="0">
+                        <a:spcBef>
+                          <a:spcPts val="0"/>
+                        </a:spcBef>
+                        <a:buNone/>
+                      </a:pPr>
+                      <a:endParaRPr dirty="0">
+                        <a:latin typeface="+mn-ea"/>
+                        <a:ea typeface="+mn-ea"/>
+                      </a:endParaRPr>
+                    </a:p>
+                  </a:txBody>
+                  <a:tcPr marL="91425" marR="91425" marT="91425" marB="91425"/>
+                </a:tc>
+              </a:tr>
+              <a:tr h="544800">
+                <a:tc>
+                  <a:txBody>
+                    <a:bodyPr/>
+                    <a:lstStyle/>
+                    <a:p>
+                      <a:pPr lvl="0" rtl="0">
+                        <a:spcBef>
+                          <a:spcPts val="0"/>
+                        </a:spcBef>
+                        <a:buNone/>
+                      </a:pPr>
+                      <a:r>
+                        <a:rPr lang="en-US" altLang="ko" dirty="0" err="1" smtClean="0">
+                          <a:latin typeface="+mn-ea"/>
+                          <a:ea typeface="+mn-ea"/>
+                        </a:rPr>
+                        <a:t>hiking_memo</a:t>
+                      </a:r>
+                      <a:endParaRPr lang="ko" altLang="ko-KR" dirty="0">
+                        <a:latin typeface="+mn-ea"/>
+                        <a:ea typeface="+mn-ea"/>
+                      </a:endParaRPr>
+                    </a:p>
+                  </a:txBody>
+                  <a:tcPr marL="91425" marR="91425" marT="91425" marB="91425"/>
+                </a:tc>
+                <a:tc>
+                  <a:txBody>
+                    <a:bodyPr/>
+                    <a:lstStyle/>
+                    <a:p>
+                      <a:pPr lvl="0" rtl="0">
+                        <a:spcBef>
+                          <a:spcPts val="0"/>
+                        </a:spcBef>
+                        <a:buNone/>
+                      </a:pPr>
+                      <a:r>
+                        <a:rPr lang="en-US" altLang="ko" smtClean="0">
+                          <a:latin typeface="+mn-ea"/>
+                          <a:ea typeface="+mn-ea"/>
+                        </a:rPr>
+                        <a:t>Varchar(50)</a:t>
+                      </a:r>
+                      <a:endParaRPr lang="ko" dirty="0">
+                        <a:latin typeface="+mn-ea"/>
+                        <a:ea typeface="+mn-ea"/>
+                      </a:endParaRPr>
+                    </a:p>
+                  </a:txBody>
+                  <a:tcPr marL="91425" marR="91425" marT="91425" marB="91425"/>
+                </a:tc>
+                <a:tc>
+                  <a:txBody>
+                    <a:bodyPr/>
+                    <a:lstStyle/>
+                    <a:p>
+                      <a:pPr lvl="0" rtl="0">
+                        <a:spcBef>
+                          <a:spcPts val="0"/>
+                        </a:spcBef>
+                        <a:buNone/>
+                      </a:pPr>
+                      <a:r>
+                        <a:rPr lang="ko-KR" altLang="en-US" smtClean="0">
+                          <a:latin typeface="+mn-ea"/>
+                          <a:ea typeface="+mn-ea"/>
+                        </a:rPr>
+                        <a:t>등산 메모</a:t>
                       </a:r>
                       <a:endParaRPr lang="ko" dirty="0">
                         <a:latin typeface="+mn-ea"/>

</xml_diff>